<commit_message>
Update Figure Figures/Figure_7/ & Figures/Figure_S_model_stability/
</commit_message>
<xml_diff>
--- a/Figures/Figure_2/Figure_2.pptx
+++ b/Figures/Figure_2/Figure_2.pptx
@@ -197,7 +197,7 @@
           <a:p>
             <a:fld id="{ABD72DE5-B6EE-E147-A976-7400C289695F}" type="datetimeFigureOut">
               <a:rPr lang="en-US" smtClean="0"/>
-              <a:t>5/20/23</a:t>
+              <a:t>5/23/23</a:t>
             </a:fld>
             <a:endParaRPr lang="en-US"/>
           </a:p>
@@ -684,7 +684,7 @@
           <a:p>
             <a:fld id="{5829EFD3-DAAF-1A4D-98F0-A61E9156FD54}" type="datetimeFigureOut">
               <a:rPr lang="en-US" smtClean="0"/>
-              <a:t>5/20/23</a:t>
+              <a:t>5/23/23</a:t>
             </a:fld>
             <a:endParaRPr lang="en-US"/>
           </a:p>
@@ -854,7 +854,7 @@
           <a:p>
             <a:fld id="{5829EFD3-DAAF-1A4D-98F0-A61E9156FD54}" type="datetimeFigureOut">
               <a:rPr lang="en-US" smtClean="0"/>
-              <a:t>5/20/23</a:t>
+              <a:t>5/23/23</a:t>
             </a:fld>
             <a:endParaRPr lang="en-US"/>
           </a:p>
@@ -1034,7 +1034,7 @@
           <a:p>
             <a:fld id="{5829EFD3-DAAF-1A4D-98F0-A61E9156FD54}" type="datetimeFigureOut">
               <a:rPr lang="en-US" smtClean="0"/>
-              <a:t>5/20/23</a:t>
+              <a:t>5/23/23</a:t>
             </a:fld>
             <a:endParaRPr lang="en-US"/>
           </a:p>
@@ -1204,7 +1204,7 @@
           <a:p>
             <a:fld id="{5829EFD3-DAAF-1A4D-98F0-A61E9156FD54}" type="datetimeFigureOut">
               <a:rPr lang="en-US" smtClean="0"/>
-              <a:t>5/20/23</a:t>
+              <a:t>5/23/23</a:t>
             </a:fld>
             <a:endParaRPr lang="en-US"/>
           </a:p>
@@ -1448,7 +1448,7 @@
           <a:p>
             <a:fld id="{5829EFD3-DAAF-1A4D-98F0-A61E9156FD54}" type="datetimeFigureOut">
               <a:rPr lang="en-US" smtClean="0"/>
-              <a:t>5/20/23</a:t>
+              <a:t>5/23/23</a:t>
             </a:fld>
             <a:endParaRPr lang="en-US"/>
           </a:p>
@@ -1680,7 +1680,7 @@
           <a:p>
             <a:fld id="{5829EFD3-DAAF-1A4D-98F0-A61E9156FD54}" type="datetimeFigureOut">
               <a:rPr lang="en-US" smtClean="0"/>
-              <a:t>5/20/23</a:t>
+              <a:t>5/23/23</a:t>
             </a:fld>
             <a:endParaRPr lang="en-US"/>
           </a:p>
@@ -2047,7 +2047,7 @@
           <a:p>
             <a:fld id="{5829EFD3-DAAF-1A4D-98F0-A61E9156FD54}" type="datetimeFigureOut">
               <a:rPr lang="en-US" smtClean="0"/>
-              <a:t>5/20/23</a:t>
+              <a:t>5/23/23</a:t>
             </a:fld>
             <a:endParaRPr lang="en-US"/>
           </a:p>
@@ -2165,7 +2165,7 @@
           <a:p>
             <a:fld id="{5829EFD3-DAAF-1A4D-98F0-A61E9156FD54}" type="datetimeFigureOut">
               <a:rPr lang="en-US" smtClean="0"/>
-              <a:t>5/20/23</a:t>
+              <a:t>5/23/23</a:t>
             </a:fld>
             <a:endParaRPr lang="en-US"/>
           </a:p>
@@ -2260,7 +2260,7 @@
           <a:p>
             <a:fld id="{5829EFD3-DAAF-1A4D-98F0-A61E9156FD54}" type="datetimeFigureOut">
               <a:rPr lang="en-US" smtClean="0"/>
-              <a:t>5/20/23</a:t>
+              <a:t>5/23/23</a:t>
             </a:fld>
             <a:endParaRPr lang="en-US"/>
           </a:p>
@@ -2537,7 +2537,7 @@
           <a:p>
             <a:fld id="{5829EFD3-DAAF-1A4D-98F0-A61E9156FD54}" type="datetimeFigureOut">
               <a:rPr lang="en-US" smtClean="0"/>
-              <a:t>5/20/23</a:t>
+              <a:t>5/23/23</a:t>
             </a:fld>
             <a:endParaRPr lang="en-US"/>
           </a:p>
@@ -2794,7 +2794,7 @@
           <a:p>
             <a:fld id="{5829EFD3-DAAF-1A4D-98F0-A61E9156FD54}" type="datetimeFigureOut">
               <a:rPr lang="en-US" smtClean="0"/>
-              <a:t>5/20/23</a:t>
+              <a:t>5/23/23</a:t>
             </a:fld>
             <a:endParaRPr lang="en-US"/>
           </a:p>
@@ -3007,7 +3007,7 @@
           <a:p>
             <a:fld id="{5829EFD3-DAAF-1A4D-98F0-A61E9156FD54}" type="datetimeFigureOut">
               <a:rPr lang="en-US" smtClean="0"/>
-              <a:t>5/20/23</a:t>
+              <a:t>5/23/23</a:t>
             </a:fld>
             <a:endParaRPr lang="en-US"/>
           </a:p>
@@ -3414,10 +3414,10 @@
       </p:grpSpPr>
       <p:pic>
         <p:nvPicPr>
-          <p:cNvPr id="11" name="Picture 10" descr="A picture containing text, line, screenshot, plot&#10;&#10;Description automatically generated">
+          <p:cNvPr id="27" name="Picture 26" descr="A picture containing text, screenshot, line, plot&#10;&#10;Description automatically generated">
             <a:extLst>
               <a:ext uri="{FF2B5EF4-FFF2-40B4-BE49-F238E27FC236}">
-                <a16:creationId xmlns:a16="http://schemas.microsoft.com/office/drawing/2014/main" id="{11139D32-7828-9EEB-6F09-F59EA048BA07}"/>
+                <a16:creationId xmlns:a16="http://schemas.microsoft.com/office/drawing/2014/main" id="{951F453E-80FF-FE1A-926F-BCF5864EA3D2}"/>
               </a:ext>
             </a:extLst>
           </p:cNvPr>
@@ -3434,7 +3434,7 @@
         </p:blipFill>
         <p:spPr>
           <a:xfrm>
-            <a:off x="15875784" y="13016815"/>
+            <a:off x="15955298" y="12938020"/>
             <a:ext cx="11816346" cy="11592693"/>
           </a:xfrm>
           <a:prstGeom prst="rect">
@@ -3444,10 +3444,10 @@
       </p:pic>
       <p:pic>
         <p:nvPicPr>
-          <p:cNvPr id="14" name="Picture 13" descr="A picture containing text, screenshot, line, plot&#10;&#10;Description automatically generated">
+          <p:cNvPr id="31" name="Picture 30" descr="A picture containing text, screenshot, line, plot&#10;&#10;Description automatically generated">
             <a:extLst>
               <a:ext uri="{FF2B5EF4-FFF2-40B4-BE49-F238E27FC236}">
-                <a16:creationId xmlns:a16="http://schemas.microsoft.com/office/drawing/2014/main" id="{099DD94F-3EA0-BE19-1635-ED533315464B}"/>
+                <a16:creationId xmlns:a16="http://schemas.microsoft.com/office/drawing/2014/main" id="{3E8C9C31-9C75-E787-72FB-7108FEE1CE8C}"/>
               </a:ext>
             </a:extLst>
           </p:cNvPr>
@@ -3464,7 +3464,7 @@
         </p:blipFill>
         <p:spPr>
           <a:xfrm>
-            <a:off x="15875784" y="895970"/>
+            <a:off x="15921876" y="817948"/>
             <a:ext cx="11816346" cy="11592693"/>
           </a:xfrm>
           <a:prstGeom prst="rect">
@@ -3474,10 +3474,10 @@
       </p:pic>
       <p:pic>
         <p:nvPicPr>
-          <p:cNvPr id="19" name="Picture 18" descr="A picture containing text, screenshot, line, plot&#10;&#10;Description automatically generated">
+          <p:cNvPr id="33" name="Picture 32" descr="A picture containing text, screenshot, line, plot&#10;&#10;Description automatically generated">
             <a:extLst>
               <a:ext uri="{FF2B5EF4-FFF2-40B4-BE49-F238E27FC236}">
-                <a16:creationId xmlns:a16="http://schemas.microsoft.com/office/drawing/2014/main" id="{74215E04-CDA7-0B75-28AB-53EFA301EB9C}"/>
+                <a16:creationId xmlns:a16="http://schemas.microsoft.com/office/drawing/2014/main" id="{2EEB614D-B47F-3C57-160F-79247240A408}"/>
               </a:ext>
             </a:extLst>
           </p:cNvPr>
@@ -3494,7 +3494,7 @@
         </p:blipFill>
         <p:spPr>
           <a:xfrm>
-            <a:off x="3832893" y="13005630"/>
+            <a:off x="3753379" y="12938020"/>
             <a:ext cx="11816346" cy="11592693"/>
           </a:xfrm>
           <a:prstGeom prst="rect">
@@ -3504,10 +3504,10 @@
       </p:pic>
       <p:pic>
         <p:nvPicPr>
-          <p:cNvPr id="26" name="Picture 25" descr="A picture containing text, screenshot, line, plot&#10;&#10;Description automatically generated">
+          <p:cNvPr id="35" name="Picture 34" descr="A picture containing text, screenshot, line, plot&#10;&#10;Description automatically generated">
             <a:extLst>
               <a:ext uri="{FF2B5EF4-FFF2-40B4-BE49-F238E27FC236}">
-                <a16:creationId xmlns:a16="http://schemas.microsoft.com/office/drawing/2014/main" id="{DAD4514F-D2FB-1E1F-D3F3-076BA10F8812}"/>
+                <a16:creationId xmlns:a16="http://schemas.microsoft.com/office/drawing/2014/main" id="{38D145C9-7E24-610A-A968-A06769935258}"/>
               </a:ext>
             </a:extLst>
           </p:cNvPr>
@@ -3524,7 +3524,7 @@
         </p:blipFill>
         <p:spPr>
           <a:xfrm>
-            <a:off x="3770725" y="894643"/>
+            <a:off x="3671314" y="821967"/>
             <a:ext cx="11816346" cy="11592693"/>
           </a:xfrm>
           <a:prstGeom prst="rect">
@@ -3534,10 +3534,10 @@
       </p:pic>
       <p:pic>
         <p:nvPicPr>
-          <p:cNvPr id="6" name="Picture 5" descr="A picture containing text, plot, diagram, line&#10;&#10;Description automatically generated">
+          <p:cNvPr id="8" name="Picture 7" descr="A picture containing screenshot, line, text, plot&#10;&#10;Description automatically generated">
             <a:extLst>
               <a:ext uri="{FF2B5EF4-FFF2-40B4-BE49-F238E27FC236}">
-                <a16:creationId xmlns:a16="http://schemas.microsoft.com/office/drawing/2014/main" id="{175EEEFE-50F3-A3DB-ECAC-9EA2B3E43983}"/>
+                <a16:creationId xmlns:a16="http://schemas.microsoft.com/office/drawing/2014/main" id="{7AF200D4-98BA-F6AB-0E1C-82C8F6A3DB3F}"/>
               </a:ext>
             </a:extLst>
           </p:cNvPr>
@@ -3554,8 +3554,8 @@
         </p:blipFill>
         <p:spPr>
           <a:xfrm>
-            <a:off x="26573229" y="25694205"/>
-            <a:ext cx="23825362" cy="10589050"/>
+            <a:off x="30251236" y="1510556"/>
+            <a:ext cx="20150281" cy="7836220"/>
           </a:xfrm>
           <a:prstGeom prst="rect">
             <a:avLst/>
@@ -3564,10 +3564,10 @@
       </p:pic>
       <p:pic>
         <p:nvPicPr>
-          <p:cNvPr id="9" name="Picture 8" descr="A picture containing text, line, plot, screenshot&#10;&#10;Description automatically generated">
+          <p:cNvPr id="12" name="Picture 11" descr="A picture containing line, plot, screenshot, diagram&#10;&#10;Description automatically generated">
             <a:extLst>
               <a:ext uri="{FF2B5EF4-FFF2-40B4-BE49-F238E27FC236}">
-                <a16:creationId xmlns:a16="http://schemas.microsoft.com/office/drawing/2014/main" id="{D1FA6450-AB7F-FA5A-3092-8F384D8FFB0D}"/>
+                <a16:creationId xmlns:a16="http://schemas.microsoft.com/office/drawing/2014/main" id="{C863EEC9-44A4-4BCB-C5F1-8AF346AFC363}"/>
               </a:ext>
             </a:extLst>
           </p:cNvPr>
@@ -3584,8 +3584,98 @@
         </p:blipFill>
         <p:spPr>
           <a:xfrm>
-            <a:off x="1374612" y="25694205"/>
-            <a:ext cx="23825362" cy="10589050"/>
+            <a:off x="30249669" y="9438754"/>
+            <a:ext cx="20150281" cy="7836220"/>
+          </a:xfrm>
+          <a:prstGeom prst="rect">
+            <a:avLst/>
+          </a:prstGeom>
+        </p:spPr>
+      </p:pic>
+      <p:pic>
+        <p:nvPicPr>
+          <p:cNvPr id="16" name="Picture 15" descr="A picture containing line, plot, screenshot, text&#10;&#10;Description automatically generated">
+            <a:extLst>
+              <a:ext uri="{FF2B5EF4-FFF2-40B4-BE49-F238E27FC236}">
+                <a16:creationId xmlns:a16="http://schemas.microsoft.com/office/drawing/2014/main" id="{EF613F78-09CE-C227-F385-6E45C7912888}"/>
+              </a:ext>
+            </a:extLst>
+          </p:cNvPr>
+          <p:cNvPicPr>
+            <a:picLocks noChangeAspect="1"/>
+          </p:cNvPicPr>
+          <p:nvPr/>
+        </p:nvPicPr>
+        <p:blipFill>
+          <a:blip r:embed="rId9"/>
+          <a:stretch>
+            <a:fillRect/>
+          </a:stretch>
+        </p:blipFill>
+        <p:spPr>
+          <a:xfrm>
+            <a:off x="30249669" y="17366953"/>
+            <a:ext cx="20150281" cy="7836220"/>
+          </a:xfrm>
+          <a:prstGeom prst="rect">
+            <a:avLst/>
+          </a:prstGeom>
+        </p:spPr>
+      </p:pic>
+      <p:pic>
+        <p:nvPicPr>
+          <p:cNvPr id="3" name="Picture 2" descr="A picture containing text, plot, diagram, line&#10;&#10;Description automatically generated">
+            <a:extLst>
+              <a:ext uri="{FF2B5EF4-FFF2-40B4-BE49-F238E27FC236}">
+                <a16:creationId xmlns:a16="http://schemas.microsoft.com/office/drawing/2014/main" id="{4EE25085-A701-A10E-941B-C75C61B889A5}"/>
+              </a:ext>
+            </a:extLst>
+          </p:cNvPr>
+          <p:cNvPicPr>
+            <a:picLocks noChangeAspect="1"/>
+          </p:cNvPicPr>
+          <p:nvPr/>
+        </p:nvPicPr>
+        <p:blipFill>
+          <a:blip r:embed="rId10"/>
+          <a:stretch>
+            <a:fillRect/>
+          </a:stretch>
+        </p:blipFill>
+        <p:spPr>
+          <a:xfrm>
+            <a:off x="26617732" y="25593202"/>
+            <a:ext cx="23825362" cy="10589049"/>
+          </a:xfrm>
+          <a:prstGeom prst="rect">
+            <a:avLst/>
+          </a:prstGeom>
+        </p:spPr>
+      </p:pic>
+      <p:pic>
+        <p:nvPicPr>
+          <p:cNvPr id="5" name="Picture 4" descr="A picture containing text, line, plot, screenshot&#10;&#10;Description automatically generated">
+            <a:extLst>
+              <a:ext uri="{FF2B5EF4-FFF2-40B4-BE49-F238E27FC236}">
+                <a16:creationId xmlns:a16="http://schemas.microsoft.com/office/drawing/2014/main" id="{1B52C7B9-0277-2D19-9B02-B90246C05619}"/>
+              </a:ext>
+            </a:extLst>
+          </p:cNvPr>
+          <p:cNvPicPr>
+            <a:picLocks noChangeAspect="1"/>
+          </p:cNvPicPr>
+          <p:nvPr/>
+        </p:nvPicPr>
+        <p:blipFill>
+          <a:blip r:embed="rId11"/>
+          <a:stretch>
+            <a:fillRect/>
+          </a:stretch>
+        </p:blipFill>
+        <p:spPr>
+          <a:xfrm>
+            <a:off x="1381586" y="25617378"/>
+            <a:ext cx="23825362" cy="10589049"/>
           </a:xfrm>
           <a:prstGeom prst="rect">
             <a:avLst/>
@@ -4055,7 +4145,7 @@
         </p:nvSpPr>
         <p:spPr>
           <a:xfrm rot="16200000">
-            <a:off x="28483781" y="4386015"/>
+            <a:off x="28372945" y="4386015"/>
             <a:ext cx="2858475" cy="1015663"/>
           </a:xfrm>
           <a:prstGeom prst="rect">
@@ -4093,7 +4183,7 @@
         </p:nvSpPr>
         <p:spPr>
           <a:xfrm rot="16200000">
-            <a:off x="27485112" y="12464393"/>
+            <a:off x="27374276" y="12464393"/>
             <a:ext cx="4855816" cy="1015663"/>
           </a:xfrm>
           <a:prstGeom prst="rect">
@@ -4131,7 +4221,7 @@
         </p:nvSpPr>
         <p:spPr>
           <a:xfrm rot="16200000">
-            <a:off x="26848045" y="20388119"/>
+            <a:off x="26737209" y="20388119"/>
             <a:ext cx="6129948" cy="1015663"/>
           </a:xfrm>
           <a:prstGeom prst="rect">
@@ -4345,7 +4435,7 @@
           <p:nvPr/>
         </p:nvPicPr>
         <p:blipFill rotWithShape="1">
-          <a:blip r:embed="rId9"/>
+          <a:blip r:embed="rId12"/>
           <a:srcRect l="20466" t="13746" r="1805" b="76626"/>
           <a:stretch/>
         </p:blipFill>
@@ -4353,96 +4443,6 @@
           <a:xfrm>
             <a:off x="31161318" y="330316"/>
             <a:ext cx="19072064" cy="918664"/>
-          </a:xfrm>
-          <a:prstGeom prst="rect">
-            <a:avLst/>
-          </a:prstGeom>
-        </p:spPr>
-      </p:pic>
-      <p:pic>
-        <p:nvPicPr>
-          <p:cNvPr id="21" name="Picture 20" descr="A picture containing screenshot, line, text, plot&#10;&#10;Description automatically generated">
-            <a:extLst>
-              <a:ext uri="{FF2B5EF4-FFF2-40B4-BE49-F238E27FC236}">
-                <a16:creationId xmlns:a16="http://schemas.microsoft.com/office/drawing/2014/main" id="{B546BC68-3B0B-F67E-FE77-B055FBE807AD}"/>
-              </a:ext>
-            </a:extLst>
-          </p:cNvPr>
-          <p:cNvPicPr>
-            <a:picLocks noChangeAspect="1"/>
-          </p:cNvPicPr>
-          <p:nvPr/>
-        </p:nvPicPr>
-        <p:blipFill>
-          <a:blip r:embed="rId10"/>
-          <a:stretch>
-            <a:fillRect/>
-          </a:stretch>
-        </p:blipFill>
-        <p:spPr>
-          <a:xfrm>
-            <a:off x="30248310" y="1432935"/>
-            <a:ext cx="20150281" cy="7836221"/>
-          </a:xfrm>
-          <a:prstGeom prst="rect">
-            <a:avLst/>
-          </a:prstGeom>
-        </p:spPr>
-      </p:pic>
-      <p:pic>
-        <p:nvPicPr>
-          <p:cNvPr id="28" name="Picture 27" descr="A picture containing line, plot, screenshot, diagram&#10;&#10;Description automatically generated">
-            <a:extLst>
-              <a:ext uri="{FF2B5EF4-FFF2-40B4-BE49-F238E27FC236}">
-                <a16:creationId xmlns:a16="http://schemas.microsoft.com/office/drawing/2014/main" id="{A150497A-D491-B9C1-CBB4-64BED93C4D1C}"/>
-              </a:ext>
-            </a:extLst>
-          </p:cNvPr>
-          <p:cNvPicPr>
-            <a:picLocks noChangeAspect="1"/>
-          </p:cNvPicPr>
-          <p:nvPr/>
-        </p:nvPicPr>
-        <p:blipFill>
-          <a:blip r:embed="rId11"/>
-          <a:stretch>
-            <a:fillRect/>
-          </a:stretch>
-        </p:blipFill>
-        <p:spPr>
-          <a:xfrm>
-            <a:off x="30249669" y="9530732"/>
-            <a:ext cx="20150281" cy="7836221"/>
-          </a:xfrm>
-          <a:prstGeom prst="rect">
-            <a:avLst/>
-          </a:prstGeom>
-        </p:spPr>
-      </p:pic>
-      <p:pic>
-        <p:nvPicPr>
-          <p:cNvPr id="30" name="Picture 29" descr="A picture containing line, plot, screenshot, text&#10;&#10;Description automatically generated">
-            <a:extLst>
-              <a:ext uri="{FF2B5EF4-FFF2-40B4-BE49-F238E27FC236}">
-                <a16:creationId xmlns:a16="http://schemas.microsoft.com/office/drawing/2014/main" id="{AF3CF681-0939-E8D3-E3DC-ACEC0983A271}"/>
-              </a:ext>
-            </a:extLst>
-          </p:cNvPr>
-          <p:cNvPicPr>
-            <a:picLocks noChangeAspect="1"/>
-          </p:cNvPicPr>
-          <p:nvPr/>
-        </p:nvPicPr>
-        <p:blipFill>
-          <a:blip r:embed="rId12"/>
-          <a:stretch>
-            <a:fillRect/>
-          </a:stretch>
-        </p:blipFill>
-        <p:spPr>
-          <a:xfrm>
-            <a:off x="30249669" y="17439681"/>
-            <a:ext cx="20150281" cy="7836221"/>
           </a:xfrm>
           <a:prstGeom prst="rect">
             <a:avLst/>

</xml_diff>